<commit_message>
Added Winscp screenshot to docs
</commit_message>
<xml_diff>
--- a/doc/ssftp-screenshots.pptx
+++ b/doc/ssftp-screenshots.pptx
@@ -7,6 +7,7 @@
   <p:sldIdLst>
     <p:sldId id="256" r:id="rId2"/>
     <p:sldId id="257" r:id="rId3"/>
+    <p:sldId id="258" r:id="rId4"/>
   </p:sldIdLst>
   <p:sldSz cx="12192000" cy="6858000"/>
   <p:notesSz cx="6858000" cy="9144000"/>
@@ -4382,6 +4383,126 @@
 </p:sld>
 </file>
 
+<file path=ppt/slides/slide3.xml><?xml version="1.0" encoding="utf-8"?>
+<p:sld xmlns:a="http://schemas.openxmlformats.org/drawingml/2006/main" xmlns:r="http://schemas.openxmlformats.org/officeDocument/2006/relationships" xmlns:p="http://schemas.openxmlformats.org/presentationml/2006/main">
+  <p:cSld>
+    <p:spTree>
+      <p:nvGrpSpPr>
+        <p:cNvPr id="1" name=""/>
+        <p:cNvGrpSpPr/>
+        <p:nvPr/>
+      </p:nvGrpSpPr>
+      <p:grpSpPr>
+        <a:xfrm>
+          <a:off x="0" y="0"/>
+          <a:ext cx="0" cy="0"/>
+          <a:chOff x="0" y="0"/>
+          <a:chExt cx="0" cy="0"/>
+        </a:xfrm>
+      </p:grpSpPr>
+      <p:pic>
+        <p:nvPicPr>
+          <p:cNvPr id="5" name="Picture 4">
+            <a:extLst>
+              <a:ext uri="{FF2B5EF4-FFF2-40B4-BE49-F238E27FC236}">
+                <a16:creationId xmlns:a16="http://schemas.microsoft.com/office/drawing/2014/main" id="{EE87BA0E-B9EF-400C-9395-71F230B52D21}"/>
+              </a:ext>
+            </a:extLst>
+          </p:cNvPr>
+          <p:cNvPicPr>
+            <a:picLocks noChangeAspect="1"/>
+          </p:cNvPicPr>
+          <p:nvPr/>
+        </p:nvPicPr>
+        <p:blipFill>
+          <a:blip r:embed="rId2"/>
+          <a:stretch>
+            <a:fillRect/>
+          </a:stretch>
+        </p:blipFill>
+        <p:spPr>
+          <a:xfrm>
+            <a:off x="-8324389" y="1124994"/>
+            <a:ext cx="7339367" cy="6858000"/>
+          </a:xfrm>
+          <a:prstGeom prst="rect">
+            <a:avLst/>
+          </a:prstGeom>
+        </p:spPr>
+      </p:pic>
+      <p:pic>
+        <p:nvPicPr>
+          <p:cNvPr id="7" name="Picture 6">
+            <a:extLst>
+              <a:ext uri="{FF2B5EF4-FFF2-40B4-BE49-F238E27FC236}">
+                <a16:creationId xmlns:a16="http://schemas.microsoft.com/office/drawing/2014/main" id="{104884C5-C087-4E1E-9BA9-836DA7229407}"/>
+              </a:ext>
+            </a:extLst>
+          </p:cNvPr>
+          <p:cNvPicPr>
+            <a:picLocks noChangeAspect="1"/>
+          </p:cNvPicPr>
+          <p:nvPr/>
+        </p:nvPicPr>
+        <p:blipFill>
+          <a:blip r:embed="rId3"/>
+          <a:stretch>
+            <a:fillRect/>
+          </a:stretch>
+        </p:blipFill>
+        <p:spPr>
+          <a:xfrm>
+            <a:off x="3848623" y="0"/>
+            <a:ext cx="4494754" cy="2666931"/>
+          </a:xfrm>
+          <a:prstGeom prst="rect">
+            <a:avLst/>
+          </a:prstGeom>
+        </p:spPr>
+      </p:pic>
+      <p:pic>
+        <p:nvPicPr>
+          <p:cNvPr id="9" name="Picture 8">
+            <a:extLst>
+              <a:ext uri="{FF2B5EF4-FFF2-40B4-BE49-F238E27FC236}">
+                <a16:creationId xmlns:a16="http://schemas.microsoft.com/office/drawing/2014/main" id="{B58CFD08-5BE2-49D9-82CD-2CB034AF0D64}"/>
+              </a:ext>
+            </a:extLst>
+          </p:cNvPr>
+          <p:cNvPicPr>
+            <a:picLocks noChangeAspect="1"/>
+          </p:cNvPicPr>
+          <p:nvPr/>
+        </p:nvPicPr>
+        <p:blipFill>
+          <a:blip r:embed="rId4"/>
+          <a:stretch>
+            <a:fillRect/>
+          </a:stretch>
+        </p:blipFill>
+        <p:spPr>
+          <a:xfrm>
+            <a:off x="3107705" y="2653506"/>
+            <a:ext cx="6376622" cy="4204494"/>
+          </a:xfrm>
+          <a:prstGeom prst="rect">
+            <a:avLst/>
+          </a:prstGeom>
+        </p:spPr>
+      </p:pic>
+    </p:spTree>
+    <p:extLst>
+      <p:ext uri="{BB962C8B-B14F-4D97-AF65-F5344CB8AC3E}">
+        <p14:creationId xmlns:p14="http://schemas.microsoft.com/office/powerpoint/2010/main" val="566681484"/>
+      </p:ext>
+    </p:extLst>
+  </p:cSld>
+  <p:clrMapOvr>
+    <a:masterClrMapping/>
+  </p:clrMapOvr>
+</p:sld>
+</file>
+
 <file path=ppt/theme/theme1.xml><?xml version="1.0" encoding="utf-8"?>
 <a:theme xmlns:a="http://schemas.openxmlformats.org/drawingml/2006/main" name="Office Theme">
   <a:themeElements>

</xml_diff>